<commit_message>
Upload julia, tools, go, scheme, update algorithm labs
</commit_message>
<xml_diff>
--- a/计算机与信息类/微机原理与系统/slides/第3章 寻址方式.pptx
+++ b/计算机与信息类/微机原理与系统/slides/第3章 寻址方式.pptx
@@ -206,6 +206,22 @@
       </a:defRPr>
     </a:lvl9pPr>
   </p:defaultTextStyle>
+  <p:extLst>
+    <p:ext uri="{EFAFB233-063F-42B5-8137-9DF3F51BA10A}">
+      <p15:sldGuideLst xmlns:p15="http://schemas.microsoft.com/office/powerpoint/2012/main">
+        <p15:guide id="1" orient="horz" pos="2160">
+          <p15:clr>
+            <a:srgbClr val="A4A3A4"/>
+          </p15:clr>
+        </p15:guide>
+        <p15:guide id="2" pos="2880">
+          <p15:clr>
+            <a:srgbClr val="A4A3A4"/>
+          </p15:clr>
+        </p15:guide>
+      </p15:sldGuideLst>
+    </p:ext>
+  </p:extLst>
 </p:presentation>
 </file>
 
@@ -909,6 +925,11 @@
         </p:txBody>
       </p:sp>
     </p:spTree>
+    <p:extLst>
+      <p:ext uri="{BB962C8B-B14F-4D97-AF65-F5344CB8AC3E}">
+        <p14:creationId xmlns:p14="http://schemas.microsoft.com/office/powerpoint/2010/main" val="1198479535"/>
+      </p:ext>
+    </p:extLst>
   </p:cSld>
   <p:clrMapOvr>
     <a:masterClrMapping/>
@@ -13056,15 +13077,23 @@
             </a:r>
             <a:r>
               <a:rPr lang="en-US" altLang="zh-CN" dirty="0" smtClean="0"/>
-              <a:t>[BX]=0100H</a:t>
+              <a:t>[DS]=</a:t>
+            </a:r>
+            <a:r>
+              <a:rPr lang="en-US" altLang="zh-CN" dirty="0" smtClean="0"/>
+              <a:t>0100H</a:t>
             </a:r>
             <a:r>
               <a:rPr lang="zh-CN" altLang="en-US" dirty="0" smtClean="0"/>
               <a:t>，</a:t>
             </a:r>
             <a:r>
+              <a:rPr lang="en-US" altLang="zh-CN" smtClean="0"/>
+              <a:t>[BX]=</a:t>
+            </a:r>
+            <a:r>
               <a:rPr lang="en-US" altLang="zh-CN" dirty="0" smtClean="0"/>
-              <a:t>[DS]=1000H</a:t>
+              <a:t>1000H</a:t>
             </a:r>
             <a:r>
               <a:rPr lang="zh-CN" altLang="en-US" dirty="0" smtClean="0"/>
@@ -13812,7 +13841,7 @@
         <p:spPr>
           <a:xfrm>
             <a:off x="107504" y="1052736"/>
-            <a:ext cx="8785671" cy="5400600"/>
+            <a:ext cx="8928992" cy="5400600"/>
           </a:xfrm>
         </p:spPr>
         <p:txBody>
@@ -13942,23 +13971,7 @@
                   <a:srgbClr val="FF0000"/>
                 </a:solidFill>
               </a:rPr>
-              <a:t>；</a:t>
-            </a:r>
-            <a:r>
-              <a:rPr lang="zh-CN" altLang="en-US" dirty="0">
-                <a:solidFill>
-                  <a:srgbClr val="FF0000"/>
-                </a:solidFill>
-              </a:rPr>
-              <a:t>除串指令</a:t>
-            </a:r>
-            <a:r>
-              <a:rPr lang="zh-CN" altLang="en-US" dirty="0" smtClean="0">
-                <a:solidFill>
-                  <a:srgbClr val="FF0000"/>
-                </a:solidFill>
-              </a:rPr>
-              <a:t>外，不允许</a:t>
+              <a:t>；错！串指令外，不允许</a:t>
             </a:r>
             <a:r>
               <a:rPr lang="en-US" altLang="zh-CN" dirty="0" err="1" smtClean="0">
@@ -13969,30 +13982,13 @@
               <a:t>Mem</a:t>
             </a:r>
             <a:r>
-              <a:rPr lang="en-US" altLang="zh-CN" dirty="0" smtClean="0">
-                <a:solidFill>
-                  <a:srgbClr val="FF0000"/>
-                </a:solidFill>
-              </a:rPr>
-              <a:t> </a:t>
-            </a:r>
-            <a:r>
-              <a:rPr lang="en-US" altLang="zh-CN" dirty="0" smtClean="0">
+              <a:rPr lang="en-US" altLang="zh-CN" dirty="0" err="1" smtClean="0">
                 <a:solidFill>
                   <a:srgbClr val="FF0000"/>
                 </a:solidFill>
                 <a:sym typeface="Wingdings" pitchFamily="2" charset="2"/>
               </a:rPr>
-              <a:t> </a:t>
-            </a:r>
-            <a:r>
-              <a:rPr lang="en-US" altLang="zh-CN" dirty="0" err="1" smtClean="0">
-                <a:solidFill>
-                  <a:srgbClr val="FF0000"/>
-                </a:solidFill>
-                <a:sym typeface="Wingdings" pitchFamily="2" charset="2"/>
-              </a:rPr>
-              <a:t>Mem</a:t>
+              <a:t>Mem</a:t>
             </a:r>
             <a:endParaRPr lang="en-US" altLang="zh-CN" dirty="0" smtClean="0">
               <a:solidFill>
@@ -14972,7 +14968,19 @@
           <a:p>
             <a:r>
               <a:rPr lang="zh-CN" altLang="en-US" dirty="0" smtClean="0"/>
-              <a:t>在实模式下，</a:t>
+              <a:t>在</a:t>
+            </a:r>
+            <a:r>
+              <a:rPr lang="zh-CN" altLang="en-US" dirty="0" smtClean="0">
+                <a:solidFill>
+                  <a:srgbClr val="0000CC"/>
+                </a:solidFill>
+              </a:rPr>
+              <a:t>实模式</a:t>
+            </a:r>
+            <a:r>
+              <a:rPr lang="zh-CN" altLang="en-US" dirty="0" smtClean="0"/>
+              <a:t>下，</a:t>
             </a:r>
             <a:r>
               <a:rPr lang="en-US" altLang="zh-CN" dirty="0" smtClean="0"/>
@@ -16281,12 +16289,20 @@
           <a:lstStyle/>
           <a:p>
             <a:r>
+              <a:rPr lang="zh-CN" altLang="en-US" dirty="0" smtClean="0"/>
+              <a:t>寄存器</a:t>
+            </a:r>
+            <a:r>
               <a:rPr lang="zh-CN" altLang="en-US" dirty="0"/>
-              <a:t>寄存器简介</a:t>
-            </a:r>
-            <a:r>
-              <a:rPr lang="zh-CN" altLang="en-US" dirty="0" smtClean="0"/>
-              <a:t>寻址常用于引用</a:t>
+              <a:t>间接</a:t>
+            </a:r>
+            <a:r>
+              <a:rPr lang="zh-CN" altLang="en-US" dirty="0" smtClean="0"/>
+              <a:t>寻址</a:t>
+            </a:r>
+            <a:r>
+              <a:rPr lang="zh-CN" altLang="en-US" dirty="0" smtClean="0"/>
+              <a:t>常用于引用</a:t>
             </a:r>
             <a:r>
               <a:rPr lang="zh-CN" altLang="en-US" dirty="0" smtClean="0">
@@ -23617,17 +23633,7 @@
                 <a:latin typeface="Arial"/>
                 <a:ea typeface="宋体"/>
               </a:rPr>
-              <a:t>比例变址</a:t>
-            </a:r>
-            <a:r>
-              <a:rPr lang="zh-CN" altLang="en-US" sz="2000" b="1" kern="0" dirty="0" smtClean="0">
-                <a:solidFill>
-                  <a:srgbClr val="000000"/>
-                </a:solidFill>
-                <a:latin typeface="Arial"/>
-                <a:ea typeface="宋体"/>
-              </a:rPr>
-              <a:t>寻址</a:t>
+              <a:t>比例变址寻址</a:t>
             </a:r>
             <a:endParaRPr lang="en-US" altLang="zh-CN" sz="2000" b="1" kern="0" dirty="0" smtClean="0">
               <a:solidFill>
@@ -26178,12 +26184,8 @@
               <a:t>注意区别：</a:t>
             </a:r>
             <a:r>
-              <a:rPr lang="en-US" altLang="zh-CN" sz="2400" dirty="0" err="1" smtClean="0"/>
-              <a:t>mov</a:t>
-            </a:r>
-            <a:r>
               <a:rPr lang="en-US" altLang="zh-CN" sz="2400" dirty="0" smtClean="0"/>
-              <a:t> AX, 2000H </a:t>
+              <a:t>MOV AX, 2000H </a:t>
             </a:r>
             <a:r>
               <a:rPr lang="zh-CN" altLang="en-US" sz="2400" dirty="0" smtClean="0"/>
@@ -28422,6 +28424,7 @@
             <a:endParaRPr lang="en-US" dirty="0"/>
           </a:p>
           <a:p>
+            <a:pPr eaLnBrk="1"/>
             <a:r>
               <a:rPr lang="zh-CN" altLang="en-US" dirty="0" smtClean="0">
                 <a:solidFill>
@@ -28439,8 +28442,12 @@
               <a:t>10000H</a:t>
             </a:r>
             <a:r>
-              <a:rPr lang="zh-CN" altLang="en-US" dirty="0" smtClean="0"/>
-              <a:t>除执行下一条指令，则地址</a:t>
+              <a:rPr lang="zh-CN" altLang="en-US" dirty="0"/>
+              <a:t>处</a:t>
+            </a:r>
+            <a:r>
+              <a:rPr lang="zh-CN" altLang="en-US" dirty="0" smtClean="0"/>
+              <a:t>执行下一条指令，则地址</a:t>
             </a:r>
             <a:r>
               <a:rPr lang="en-US" altLang="zh-CN" dirty="0" smtClean="0"/>
@@ -29209,23 +29216,15 @@
             </a:r>
             <a:r>
               <a:rPr lang="zh-CN" altLang="en-US" dirty="0" smtClean="0"/>
-              <a:t>寄存器包含</a:t>
-            </a:r>
-            <a:r>
-              <a:rPr lang="zh-CN" altLang="en-US" smtClean="0"/>
-              <a:t>一个</a:t>
-            </a:r>
-            <a:r>
-              <a:rPr lang="zh-CN" altLang="en-US"/>
+              <a:t>寄存器包含一个</a:t>
+            </a:r>
+            <a:r>
+              <a:rPr lang="zh-CN" altLang="en-US" dirty="0"/>
               <a:t>指向</a:t>
             </a:r>
             <a:r>
-              <a:rPr lang="zh-CN" altLang="en-US" smtClean="0"/>
-              <a:t>描述符</a:t>
-            </a:r>
-            <a:r>
-              <a:rPr lang="zh-CN" altLang="en-US" dirty="0" smtClean="0"/>
-              <a:t>的指针，该描述符包含了访问权限和特权级，但不包含</a:t>
+              <a:rPr lang="zh-CN" altLang="en-US" dirty="0" smtClean="0"/>
+              <a:t>描述符的指针，该描述符包含了访问权限和特权级，但不包含</a:t>
             </a:r>
             <a:r>
               <a:rPr lang="en-US" altLang="zh-CN" dirty="0" smtClean="0"/>
@@ -29392,7 +29391,7 @@
           <a:graphicData uri="http://schemas.openxmlformats.org/presentationml/2006/ole">
             <mc:AlternateContent xmlns:mc="http://schemas.openxmlformats.org/markup-compatibility/2006">
               <mc:Choice xmlns:v="urn:schemas-microsoft-com:vml" Requires="v">
-                <p:oleObj spid="_x0000_s10318" name="Visio" r:id="rId3" imgW="2914858" imgH="3091503" progId="Visio.Drawing.11">
+                <p:oleObj spid="_x0000_s10322" name="Visio" r:id="rId3" imgW="2914858" imgH="3091503" progId="Visio.Drawing.11">
                   <p:embed/>
                 </p:oleObj>
               </mc:Choice>
@@ -29607,7 +29606,7 @@
         </p:blipFill>
         <p:spPr bwMode="auto">
           <a:xfrm>
-            <a:off x="3347864" y="3429000"/>
+            <a:off x="2547585" y="3573016"/>
             <a:ext cx="3904368" cy="1944216"/>
           </a:xfrm>
           <a:prstGeom prst="rect">
@@ -32934,7 +32933,7 @@
           <a:graphicData uri="http://schemas.openxmlformats.org/presentationml/2006/ole">
             <mc:AlternateContent xmlns:mc="http://schemas.openxmlformats.org/markup-compatibility/2006">
               <mc:Choice xmlns:v="urn:schemas-microsoft-com:vml" Requires="v">
-                <p:oleObj spid="_x0000_s7254" name="Visio" r:id="rId3" imgW="2722003" imgH="3919451" progId="Visio.Drawing.11">
+                <p:oleObj spid="_x0000_s7258" name="Visio" r:id="rId3" imgW="2722003" imgH="3919451" progId="Visio.Drawing.11">
                   <p:embed/>
                 </p:oleObj>
               </mc:Choice>

</xml_diff>